<commit_message>
update 023FW_DataFlow form 01 to 03.
</commit_message>
<xml_diff>
--- a/023FW_DataFlow/01.introduction.pptx
+++ b/023FW_DataFlow/01.introduction.pptx
@@ -380,7 +380,7 @@
               <a:pPr>
                 <a:defRPr/>
               </a:pPr>
-              <a:t>2022/12/14</a:t>
+              <a:t>2023/7/11</a:t>
             </a:fld>
             <a:endParaRPr lang="en-US" altLang="zh-CN"/>
           </a:p>
@@ -633,7 +633,7 @@
             <a:fld id="{C45443A1-D8F2-48CD-A659-3CEDBA8DF541}" type="datetimeFigureOut">
               <a:rPr lang="zh-CN" altLang="en-US" smtClean="0"/>
               <a:pPr/>
-              <a:t>2022/12/14</a:t>
+              <a:t>2023/7/11</a:t>
             </a:fld>
             <a:endParaRPr lang="zh-CN" altLang="en-US"/>
           </a:p>
@@ -17447,16 +17447,13 @@
               </a:rPr>
               <a:t>ZOMI</a:t>
             </a:r>
-            <a:r>
-              <a:rPr lang="zh-CN" altLang="en-US" sz="4400" b="1" dirty="0">
-                <a:solidFill>
-                  <a:srgbClr val="384056"/>
-                </a:solidFill>
-                <a:latin typeface="GEETYPE-SkyGB-Flash Reguar" panose="02010604000000000000" pitchFamily="2" charset="-122"/>
-                <a:ea typeface="GEETYPE-SkyGB-Flash Reguar" panose="02010604000000000000" pitchFamily="2" charset="-122"/>
-              </a:rPr>
-              <a:t>酱</a:t>
-            </a:r>
+            <a:endParaRPr lang="zh-CN" altLang="en-US" sz="4400" b="1" dirty="0">
+              <a:solidFill>
+                <a:srgbClr val="384056"/>
+              </a:solidFill>
+              <a:latin typeface="GEETYPE-SkyGB-Flash Reguar" panose="02010604000000000000" pitchFamily="2" charset="-122"/>
+              <a:ea typeface="GEETYPE-SkyGB-Flash Reguar" panose="02010604000000000000" pitchFamily="2" charset="-122"/>
+            </a:endParaRPr>
           </a:p>
         </p:txBody>
       </p:sp>

</xml_diff>